<commit_message>
Clean up breakdown slide, add data cleaning note
</commit_message>
<xml_diff>
--- a/Presentation/CSC505Presentation3.pptx
+++ b/Presentation/CSC505Presentation3.pptx
@@ -2017,7 +2017,7 @@
   <p:cSld>
     <p:spTree>
       <p:nvGrpSpPr>
-        <p:cNvPr id="250" name="Shape 250"/>
+        <p:cNvPr id="249" name="Shape 249"/>
         <p:cNvGrpSpPr/>
         <p:nvPr/>
       </p:nvGrpSpPr>
@@ -2031,7 +2031,7 @@
       </p:grpSpPr>
       <p:sp>
         <p:nvSpPr>
-          <p:cNvPr id="251" name="Google Shape;251;g444104a177_0_0:notes"/>
+          <p:cNvPr id="250" name="Google Shape;250;g444104a177_0_0:notes"/>
           <p:cNvSpPr/>
           <p:nvPr>
             <p:ph idx="2" type="sldImg"/>
@@ -2066,7 +2066,7 @@
       </p:sp>
       <p:sp>
         <p:nvSpPr>
-          <p:cNvPr id="252" name="Google Shape;252;g444104a177_0_0:notes"/>
+          <p:cNvPr id="251" name="Google Shape;251;g444104a177_0_0:notes"/>
           <p:cNvSpPr txBox="1"/>
           <p:nvPr>
             <p:ph idx="1" type="body"/>
@@ -2116,7 +2116,7 @@
   <p:cSld>
     <p:spTree>
       <p:nvGrpSpPr>
-        <p:cNvPr id="255" name="Shape 255"/>
+        <p:cNvPr id="254" name="Shape 254"/>
         <p:cNvGrpSpPr/>
         <p:nvPr/>
       </p:nvGrpSpPr>
@@ -2130,7 +2130,7 @@
       </p:grpSpPr>
       <p:sp>
         <p:nvSpPr>
-          <p:cNvPr id="256" name="Google Shape;256;g444104a177_0_14:notes"/>
+          <p:cNvPr id="255" name="Google Shape;255;g444104a177_0_14:notes"/>
           <p:cNvSpPr/>
           <p:nvPr>
             <p:ph idx="2" type="sldImg"/>
@@ -2165,7 +2165,7 @@
       </p:sp>
       <p:sp>
         <p:nvSpPr>
-          <p:cNvPr id="257" name="Google Shape;257;g444104a177_0_14:notes"/>
+          <p:cNvPr id="256" name="Google Shape;256;g444104a177_0_14:notes"/>
           <p:cNvSpPr txBox="1"/>
           <p:nvPr>
             <p:ph idx="1" type="body"/>
@@ -2215,7 +2215,7 @@
   <p:cSld>
     <p:spTree>
       <p:nvGrpSpPr>
-        <p:cNvPr id="261" name="Shape 261"/>
+        <p:cNvPr id="260" name="Shape 260"/>
         <p:cNvGrpSpPr/>
         <p:nvPr/>
       </p:nvGrpSpPr>
@@ -2229,7 +2229,7 @@
       </p:grpSpPr>
       <p:sp>
         <p:nvSpPr>
-          <p:cNvPr id="262" name="Google Shape;262;g444104a177_0_19:notes"/>
+          <p:cNvPr id="261" name="Google Shape;261;g444104a177_0_19:notes"/>
           <p:cNvSpPr/>
           <p:nvPr>
             <p:ph idx="2" type="sldImg"/>
@@ -2264,7 +2264,7 @@
       </p:sp>
       <p:sp>
         <p:nvSpPr>
-          <p:cNvPr id="263" name="Google Shape;263;g444104a177_0_19:notes"/>
+          <p:cNvPr id="262" name="Google Shape;262;g444104a177_0_19:notes"/>
           <p:cNvSpPr txBox="1"/>
           <p:nvPr>
             <p:ph idx="1" type="body"/>
@@ -2314,7 +2314,7 @@
   <p:cSld>
     <p:spTree>
       <p:nvGrpSpPr>
-        <p:cNvPr id="267" name="Shape 267"/>
+        <p:cNvPr id="266" name="Shape 266"/>
         <p:cNvGrpSpPr/>
         <p:nvPr/>
       </p:nvGrpSpPr>
@@ -2328,7 +2328,7 @@
       </p:grpSpPr>
       <p:sp>
         <p:nvSpPr>
-          <p:cNvPr id="268" name="Google Shape;268;g444104a177_0_4:notes"/>
+          <p:cNvPr id="267" name="Google Shape;267;g444104a177_0_4:notes"/>
           <p:cNvSpPr/>
           <p:nvPr>
             <p:ph idx="2" type="sldImg"/>
@@ -2363,7 +2363,7 @@
       </p:sp>
       <p:sp>
         <p:nvSpPr>
-          <p:cNvPr id="269" name="Google Shape;269;g444104a177_0_4:notes"/>
+          <p:cNvPr id="268" name="Google Shape;268;g444104a177_0_4:notes"/>
           <p:cNvSpPr txBox="1"/>
           <p:nvPr>
             <p:ph idx="1" type="body"/>
@@ -2413,7 +2413,7 @@
   <p:cSld>
     <p:spTree>
       <p:nvGrpSpPr>
-        <p:cNvPr id="273" name="Shape 273"/>
+        <p:cNvPr id="272" name="Shape 272"/>
         <p:cNvGrpSpPr/>
         <p:nvPr/>
       </p:nvGrpSpPr>
@@ -2427,7 +2427,7 @@
       </p:grpSpPr>
       <p:sp>
         <p:nvSpPr>
-          <p:cNvPr id="274" name="Google Shape;274;g444104a177_0_29:notes"/>
+          <p:cNvPr id="273" name="Google Shape;273;g444104a177_0_29:notes"/>
           <p:cNvSpPr/>
           <p:nvPr>
             <p:ph idx="2" type="sldImg"/>
@@ -2462,7 +2462,7 @@
       </p:sp>
       <p:sp>
         <p:nvSpPr>
-          <p:cNvPr id="275" name="Google Shape;275;g444104a177_0_29:notes"/>
+          <p:cNvPr id="274" name="Google Shape;274;g444104a177_0_29:notes"/>
           <p:cNvSpPr txBox="1"/>
           <p:nvPr>
             <p:ph idx="1" type="body"/>
@@ -2512,7 +2512,7 @@
   <p:cSld>
     <p:spTree>
       <p:nvGrpSpPr>
-        <p:cNvPr id="279" name="Shape 279"/>
+        <p:cNvPr id="278" name="Shape 278"/>
         <p:cNvGrpSpPr/>
         <p:nvPr/>
       </p:nvGrpSpPr>
@@ -2526,7 +2526,7 @@
       </p:grpSpPr>
       <p:sp>
         <p:nvSpPr>
-          <p:cNvPr id="280" name="Google Shape;280;g444104a177_0_39:notes"/>
+          <p:cNvPr id="279" name="Google Shape;279;g444104a177_0_39:notes"/>
           <p:cNvSpPr/>
           <p:nvPr>
             <p:ph idx="2" type="sldImg"/>
@@ -2561,7 +2561,7 @@
       </p:sp>
       <p:sp>
         <p:nvSpPr>
-          <p:cNvPr id="281" name="Google Shape;281;g444104a177_0_39:notes"/>
+          <p:cNvPr id="280" name="Google Shape;280;g444104a177_0_39:notes"/>
           <p:cNvSpPr txBox="1"/>
           <p:nvPr>
             <p:ph idx="1" type="body"/>
@@ -11533,7 +11533,7 @@
             </a:pPr>
             <a:r>
               <a:rPr lang="en"/>
-              <a:t>Greg Purvine</a:t>
+              <a:t>Greg Purvine (gnpurvin)</a:t>
             </a:r>
             <a:endParaRPr/>
           </a:p>
@@ -11549,7 +11549,7 @@
             </a:pPr>
             <a:r>
               <a:rPr lang="en"/>
-              <a:t>Vincent Xiao</a:t>
+              <a:t>Vincent Xiao (MrVinegar)</a:t>
             </a:r>
             <a:endParaRPr/>
           </a:p>
@@ -11581,7 +11581,7 @@
             </a:pPr>
             <a:r>
               <a:rPr lang="en"/>
-              <a:t>Rohit Gulia</a:t>
+              <a:t>Rohit Gulia (rohit-gulia)</a:t>
             </a:r>
             <a:endParaRPr/>
           </a:p>
@@ -11597,7 +11597,7 @@
             </a:pPr>
             <a:r>
               <a:rPr lang="en"/>
-              <a:t>Cody Cothern</a:t>
+              <a:t>Cody Cothern (Mask487)</a:t>
             </a:r>
             <a:endParaRPr/>
           </a:p>
@@ -12446,7 +12446,7 @@
             </a:endParaRPr>
           </a:p>
           <a:p>
-            <a:pPr indent="-342900" lvl="1" marL="914400" rtl="0" algn="l">
+            <a:pPr indent="-317500" lvl="1" marL="914400" rtl="0" algn="l">
               <a:spcBef>
                 <a:spcPts val="0"/>
               </a:spcBef>
@@ -12454,36 +12454,36 @@
                 <a:spcPts val="0"/>
               </a:spcAft>
               <a:buClr>
-                <a:schemeClr val="lt1"/>
+                <a:srgbClr val="FFFFFF"/>
               </a:buClr>
-              <a:buSzPts val="1800"/>
+              <a:buSzPts val="1400"/>
               <a:buFont typeface="Montserrat"/>
               <a:buChar char="○"/>
             </a:pPr>
             <a:r>
-              <a:rPr b="1" lang="en" sz="1350">
+              <a:rPr lang="en">
                 <a:solidFill>
-                  <a:srgbClr val="666666"/>
+                  <a:srgbClr val="FFFFFF"/>
                 </a:solidFill>
-                <a:latin typeface="Georgia"/>
-                <a:ea typeface="Georgia"/>
-                <a:cs typeface="Georgia"/>
-                <a:sym typeface="Georgia"/>
+                <a:latin typeface="Montserrat"/>
+                <a:ea typeface="Montserrat"/>
+                <a:cs typeface="Montserrat"/>
+                <a:sym typeface="Montserrat"/>
               </a:rPr>
-              <a:t>Nearest neighbor techniques</a:t>
+              <a:t>Law Enf Administration        </a:t>
             </a:r>
-            <a:endParaRPr b="1" sz="1350">
+            <a:endParaRPr>
               <a:solidFill>
-                <a:srgbClr val="666666"/>
+                <a:srgbClr val="FFFFFF"/>
               </a:solidFill>
-              <a:latin typeface="Georgia"/>
-              <a:ea typeface="Georgia"/>
-              <a:cs typeface="Georgia"/>
-              <a:sym typeface="Georgia"/>
+              <a:latin typeface="Montserrat"/>
+              <a:ea typeface="Montserrat"/>
+              <a:cs typeface="Montserrat"/>
+              <a:sym typeface="Montserrat"/>
             </a:endParaRPr>
           </a:p>
           <a:p>
-            <a:pPr indent="-342900" lvl="1" marL="914400" rtl="0" algn="l">
+            <a:pPr indent="-317500" lvl="1" marL="914400" rtl="0" algn="l">
               <a:spcBef>
                 <a:spcPts val="0"/>
               </a:spcBef>
@@ -12491,32 +12491,69 @@
                 <a:spcPts val="0"/>
               </a:spcAft>
               <a:buClr>
-                <a:schemeClr val="lt1"/>
+                <a:srgbClr val="FFFFFF"/>
               </a:buClr>
-              <a:buSzPts val="1800"/>
+              <a:buSzPts val="1400"/>
               <a:buFont typeface="Montserrat"/>
               <a:buChar char="○"/>
             </a:pPr>
             <a:r>
-              <a:rPr b="1" lang="en" sz="1350">
+              <a:rPr lang="en">
                 <a:solidFill>
-                  <a:srgbClr val="666666"/>
+                  <a:srgbClr val="FFFFFF"/>
                 </a:solidFill>
-                <a:latin typeface="Georgia"/>
-                <a:ea typeface="Georgia"/>
-                <a:cs typeface="Georgia"/>
-                <a:sym typeface="Georgia"/>
+                <a:latin typeface="Montserrat"/>
+                <a:ea typeface="Montserrat"/>
+                <a:cs typeface="Montserrat"/>
+                <a:sym typeface="Montserrat"/>
+              </a:rPr>
+              <a:t>Nearest neighbor techniques</a:t>
+            </a:r>
+            <a:endParaRPr>
+              <a:solidFill>
+                <a:srgbClr val="FFFFFF"/>
+              </a:solidFill>
+              <a:latin typeface="Montserrat"/>
+              <a:ea typeface="Montserrat"/>
+              <a:cs typeface="Montserrat"/>
+              <a:sym typeface="Montserrat"/>
+            </a:endParaRPr>
+          </a:p>
+          <a:p>
+            <a:pPr indent="-317500" lvl="1" marL="914400" rtl="0" algn="l">
+              <a:spcBef>
+                <a:spcPts val="0"/>
+              </a:spcBef>
+              <a:spcAft>
+                <a:spcPts val="0"/>
+              </a:spcAft>
+              <a:buClr>
+                <a:srgbClr val="FFFFFF"/>
+              </a:buClr>
+              <a:buSzPts val="1400"/>
+              <a:buFont typeface="Montserrat"/>
+              <a:buChar char="○"/>
+            </a:pPr>
+            <a:r>
+              <a:rPr lang="en">
+                <a:solidFill>
+                  <a:srgbClr val="FFFFFF"/>
+                </a:solidFill>
+                <a:latin typeface="Montserrat"/>
+                <a:ea typeface="Montserrat"/>
+                <a:cs typeface="Montserrat"/>
+                <a:sym typeface="Montserrat"/>
               </a:rPr>
               <a:t>Clustering  </a:t>
             </a:r>
-            <a:endParaRPr b="1" sz="1350">
+            <a:endParaRPr>
               <a:solidFill>
-                <a:srgbClr val="666666"/>
+                <a:srgbClr val="FFFFFF"/>
               </a:solidFill>
-              <a:latin typeface="Georgia"/>
-              <a:ea typeface="Georgia"/>
-              <a:cs typeface="Georgia"/>
-              <a:sym typeface="Georgia"/>
+              <a:latin typeface="Montserrat"/>
+              <a:ea typeface="Montserrat"/>
+              <a:cs typeface="Montserrat"/>
+              <a:sym typeface="Montserrat"/>
             </a:endParaRPr>
           </a:p>
           <a:p>
@@ -13015,8 +13052,8 @@
         </p:blipFill>
         <p:spPr>
           <a:xfrm>
-            <a:off x="910375" y="523275"/>
-            <a:ext cx="7961726" cy="4478471"/>
+            <a:off x="1003300" y="1307850"/>
+            <a:ext cx="7961726" cy="3481350"/>
           </a:xfrm>
           <a:prstGeom prst="rect">
             <a:avLst/>
@@ -13060,7 +13097,8 @@
               <a:buNone/>
             </a:pPr>
             <a:r>
-              <a:t/>
+              <a:rPr lang="en"/>
+              <a:t>Transactions in 2013 for a few departments grouped by month</a:t>
             </a:r>
             <a:endParaRPr/>
           </a:p>
@@ -13082,7 +13120,7 @@
         </p:blipFill>
         <p:spPr>
           <a:xfrm>
-            <a:off x="967275" y="1424350"/>
+            <a:off x="967275" y="1443050"/>
             <a:ext cx="2490301" cy="2448650"/>
           </a:xfrm>
           <a:prstGeom prst="rect">
@@ -13196,48 +13234,6 @@
           </a:p>
         </p:txBody>
       </p:sp>
-      <p:sp>
-        <p:nvSpPr>
-          <p:cNvPr id="249" name="Google Shape;249;p32"/>
-          <p:cNvSpPr txBox="1"/>
-          <p:nvPr/>
-        </p:nvSpPr>
-        <p:spPr>
-          <a:xfrm>
-            <a:off x="2267325" y="830525"/>
-            <a:ext cx="4783800" cy="558000"/>
-          </a:xfrm>
-          <a:prstGeom prst="rect">
-            <a:avLst/>
-          </a:prstGeom>
-          <a:noFill/>
-          <a:ln>
-            <a:noFill/>
-          </a:ln>
-        </p:spPr>
-        <p:txBody>
-          <a:bodyPr anchorCtr="0" anchor="t" bIns="91425" lIns="91425" spcFirstLastPara="1" rIns="91425" wrap="square" tIns="91425">
-            <a:noAutofit/>
-          </a:bodyPr>
-          <a:lstStyle/>
-          <a:p>
-            <a:pPr indent="0" lvl="0" marL="0" rtl="0" algn="l">
-              <a:spcBef>
-                <a:spcPts val="0"/>
-              </a:spcBef>
-              <a:spcAft>
-                <a:spcPts val="0"/>
-              </a:spcAft>
-              <a:buNone/>
-            </a:pPr>
-            <a:r>
-              <a:rPr lang="en"/>
-              <a:t>Transactions in 2013 grouped by month</a:t>
-            </a:r>
-            <a:endParaRPr/>
-          </a:p>
-        </p:txBody>
-      </p:sp>
     </p:spTree>
   </p:cSld>
   <p:clrMapOvr>
@@ -13251,7 +13247,7 @@
   <p:cSld>
     <p:spTree>
       <p:nvGrpSpPr>
-        <p:cNvPr id="253" name="Shape 253"/>
+        <p:cNvPr id="252" name="Shape 252"/>
         <p:cNvGrpSpPr/>
         <p:nvPr/>
       </p:nvGrpSpPr>
@@ -13265,7 +13261,7 @@
       </p:grpSpPr>
       <p:sp>
         <p:nvSpPr>
-          <p:cNvPr id="254" name="Google Shape;254;p33"/>
+          <p:cNvPr id="253" name="Google Shape;253;p33"/>
           <p:cNvSpPr txBox="1"/>
           <p:nvPr>
             <p:ph type="title"/>
@@ -13316,7 +13312,7 @@
   <p:cSld>
     <p:spTree>
       <p:nvGrpSpPr>
-        <p:cNvPr id="258" name="Shape 258"/>
+        <p:cNvPr id="257" name="Shape 257"/>
         <p:cNvGrpSpPr/>
         <p:nvPr/>
       </p:nvGrpSpPr>
@@ -13330,7 +13326,7 @@
       </p:grpSpPr>
       <p:sp>
         <p:nvSpPr>
-          <p:cNvPr id="259" name="Google Shape;259;p34"/>
+          <p:cNvPr id="258" name="Google Shape;258;p34"/>
           <p:cNvSpPr txBox="1"/>
           <p:nvPr>
             <p:ph type="title"/>
@@ -13361,7 +13357,8 @@
               <a:buNone/>
             </a:pPr>
             <a:r>
-              <a:t/>
+              <a:rPr lang="en"/>
+              <a:t>Probability distribution for Top Spending Departments</a:t>
             </a:r>
             <a:endParaRPr/>
           </a:p>
@@ -13369,7 +13366,7 @@
       </p:sp>
       <p:pic>
         <p:nvPicPr>
-          <p:cNvPr id="260" name="Google Shape;260;p34"/>
+          <p:cNvPr id="259" name="Google Shape;259;p34"/>
           <p:cNvPicPr preferRelativeResize="0"/>
           <p:nvPr/>
         </p:nvPicPr>
@@ -13408,7 +13405,7 @@
   <p:cSld>
     <p:spTree>
       <p:nvGrpSpPr>
-        <p:cNvPr id="264" name="Shape 264"/>
+        <p:cNvPr id="263" name="Shape 263"/>
         <p:cNvGrpSpPr/>
         <p:nvPr/>
       </p:nvGrpSpPr>
@@ -13422,7 +13419,7 @@
       </p:grpSpPr>
       <p:sp>
         <p:nvSpPr>
-          <p:cNvPr id="265" name="Google Shape;265;p35"/>
+          <p:cNvPr id="264" name="Google Shape;264;p35"/>
           <p:cNvSpPr txBox="1"/>
           <p:nvPr>
             <p:ph type="title"/>
@@ -13453,7 +13450,8 @@
               <a:buNone/>
             </a:pPr>
             <a:r>
-              <a:t/>
+              <a:rPr lang="en"/>
+              <a:t>Probability distribution for Least Spending Departments</a:t>
             </a:r>
             <a:endParaRPr/>
           </a:p>
@@ -13461,7 +13459,7 @@
       </p:sp>
       <p:pic>
         <p:nvPicPr>
-          <p:cNvPr id="266" name="Google Shape;266;p35"/>
+          <p:cNvPr id="265" name="Google Shape;265;p35"/>
           <p:cNvPicPr preferRelativeResize="0"/>
           <p:nvPr/>
         </p:nvPicPr>
@@ -13500,7 +13498,7 @@
   <p:cSld>
     <p:spTree>
       <p:nvGrpSpPr>
-        <p:cNvPr id="270" name="Shape 270"/>
+        <p:cNvPr id="269" name="Shape 269"/>
         <p:cNvGrpSpPr/>
         <p:nvPr/>
       </p:nvGrpSpPr>
@@ -13514,7 +13512,7 @@
       </p:grpSpPr>
       <p:sp>
         <p:nvSpPr>
-          <p:cNvPr id="271" name="Google Shape;271;p36"/>
+          <p:cNvPr id="270" name="Google Shape;270;p36"/>
           <p:cNvSpPr txBox="1"/>
           <p:nvPr>
             <p:ph type="title"/>
@@ -13554,7 +13552,7 @@
       </p:sp>
       <p:pic>
         <p:nvPicPr>
-          <p:cNvPr id="272" name="Google Shape;272;p36"/>
+          <p:cNvPr id="271" name="Google Shape;271;p36"/>
           <p:cNvPicPr preferRelativeResize="0"/>
           <p:nvPr/>
         </p:nvPicPr>
@@ -13593,7 +13591,7 @@
   <p:cSld>
     <p:spTree>
       <p:nvGrpSpPr>
-        <p:cNvPr id="276" name="Shape 276"/>
+        <p:cNvPr id="275" name="Shape 275"/>
         <p:cNvGrpSpPr/>
         <p:nvPr/>
       </p:nvGrpSpPr>
@@ -13607,7 +13605,7 @@
       </p:grpSpPr>
       <p:sp>
         <p:nvSpPr>
-          <p:cNvPr id="277" name="Google Shape;277;p37"/>
+          <p:cNvPr id="276" name="Google Shape;276;p37"/>
           <p:cNvSpPr txBox="1"/>
           <p:nvPr>
             <p:ph type="title"/>
@@ -13647,7 +13645,7 @@
       </p:sp>
       <p:sp>
         <p:nvSpPr>
-          <p:cNvPr id="278" name="Google Shape;278;p37"/>
+          <p:cNvPr id="277" name="Google Shape;277;p37"/>
           <p:cNvSpPr txBox="1"/>
           <p:nvPr>
             <p:ph idx="1" type="body"/>
@@ -13680,7 +13678,58 @@
             </a:pPr>
             <a:r>
               <a:rPr lang="en" sz="1400"/>
-              <a:t>In the future we will be working with outliers and anomalies</a:t>
+              <a:t>Additional data cleaning</a:t>
+            </a:r>
+            <a:endParaRPr sz="1400"/>
+          </a:p>
+          <a:p>
+            <a:pPr indent="-317500" lvl="1" marL="914400" rtl="0" algn="l">
+              <a:spcBef>
+                <a:spcPts val="0"/>
+              </a:spcBef>
+              <a:spcAft>
+                <a:spcPts val="0"/>
+              </a:spcAft>
+              <a:buSzPts val="1400"/>
+              <a:buAutoNum type="alphaLcPeriod"/>
+            </a:pPr>
+            <a:r>
+              <a:rPr lang="en" sz="1400"/>
+              <a:t>Unknown accounts</a:t>
+            </a:r>
+            <a:endParaRPr sz="1400"/>
+          </a:p>
+          <a:p>
+            <a:pPr indent="-317500" lvl="1" marL="914400" rtl="0" algn="l">
+              <a:spcBef>
+                <a:spcPts val="0"/>
+              </a:spcBef>
+              <a:spcAft>
+                <a:spcPts val="0"/>
+              </a:spcAft>
+              <a:buSzPts val="1400"/>
+              <a:buAutoNum type="alphaLcPeriod"/>
+            </a:pPr>
+            <a:r>
+              <a:rPr lang="en" sz="1400"/>
+              <a:t>2017 transactions end in June?</a:t>
+            </a:r>
+            <a:endParaRPr sz="1400"/>
+          </a:p>
+          <a:p>
+            <a:pPr indent="-317500" lvl="0" marL="457200" rtl="0" algn="l">
+              <a:spcBef>
+                <a:spcPts val="0"/>
+              </a:spcBef>
+              <a:spcAft>
+                <a:spcPts val="0"/>
+              </a:spcAft>
+              <a:buSzPts val="1400"/>
+              <a:buAutoNum type="arabicPeriod"/>
+            </a:pPr>
+            <a:r>
+              <a:rPr lang="en" sz="1400"/>
+              <a:t>In the future we will be working with outliers and anomalies.</a:t>
             </a:r>
             <a:endParaRPr sz="1400"/>
           </a:p>
@@ -13748,7 +13797,7 @@
             </a:pPr>
             <a:r>
               <a:rPr lang="en" sz="1400"/>
-              <a:t>Any correlation between department budgets</a:t>
+              <a:t>Any correlation between department budgets.</a:t>
             </a:r>
             <a:endParaRPr sz="1400"/>
           </a:p>
@@ -13767,7 +13816,7 @@
   <p:cSld>
     <p:spTree>
       <p:nvGrpSpPr>
-        <p:cNvPr id="282" name="Shape 282"/>
+        <p:cNvPr id="281" name="Shape 281"/>
         <p:cNvGrpSpPr/>
         <p:nvPr/>
       </p:nvGrpSpPr>
@@ -13781,7 +13830,7 @@
       </p:grpSpPr>
       <p:sp>
         <p:nvSpPr>
-          <p:cNvPr id="283" name="Google Shape;283;p38"/>
+          <p:cNvPr id="282" name="Google Shape;282;p38"/>
           <p:cNvSpPr txBox="1"/>
           <p:nvPr>
             <p:ph type="ctrTitle"/>
@@ -13821,7 +13870,7 @@
       </p:sp>
       <p:sp>
         <p:nvSpPr>
-          <p:cNvPr id="284" name="Google Shape;284;p38"/>
+          <p:cNvPr id="283" name="Google Shape;283;p38"/>
           <p:cNvSpPr txBox="1"/>
           <p:nvPr>
             <p:ph idx="1" type="subTitle"/>
@@ -14771,6 +14820,285 @@
 </file>
 
 <file path=ppt/theme/theme1.xml><?xml version="1.0" encoding="utf-8"?>
+<a:theme xmlns:a="http://schemas.openxmlformats.org/drawingml/2006/main" xmlns:r="http://schemas.openxmlformats.org/officeDocument/2006/relationships">
+  <a:themeElements>
+    <a:clrScheme name="Default">
+      <a:dk1>
+        <a:srgbClr val="000000"/>
+      </a:dk1>
+      <a:lt1>
+        <a:srgbClr val="FFFFFF"/>
+      </a:lt1>
+      <a:dk2>
+        <a:srgbClr val="158158"/>
+      </a:dk2>
+      <a:lt2>
+        <a:srgbClr val="F3F3F3"/>
+      </a:lt2>
+      <a:accent1>
+        <a:srgbClr val="058DC7"/>
+      </a:accent1>
+      <a:accent2>
+        <a:srgbClr val="50B432"/>
+      </a:accent2>
+      <a:accent3>
+        <a:srgbClr val="ED561B"/>
+      </a:accent3>
+      <a:accent4>
+        <a:srgbClr val="EDEF00"/>
+      </a:accent4>
+      <a:accent5>
+        <a:srgbClr val="24CBE5"/>
+      </a:accent5>
+      <a:accent6>
+        <a:srgbClr val="64E572"/>
+      </a:accent6>
+      <a:hlink>
+        <a:srgbClr val="2200CC"/>
+      </a:hlink>
+      <a:folHlink>
+        <a:srgbClr val="551A8B"/>
+      </a:folHlink>
+    </a:clrScheme>
+    <a:fontScheme name="Office">
+      <a:majorFont>
+        <a:latin typeface="Arial"/>
+        <a:ea typeface=""/>
+        <a:cs typeface=""/>
+        <a:font script="Jpan" typeface="ＭＳ Ｐゴシック"/>
+        <a:font script="Hang" typeface="맑은 고딕"/>
+        <a:font script="Hans" typeface="宋体"/>
+        <a:font script="Hant" typeface="新細明體"/>
+        <a:font script="Arab" typeface="Times New Roman"/>
+        <a:font script="Hebr" typeface="Times New Roman"/>
+        <a:font script="Thai" typeface="Angsana New"/>
+        <a:font script="Ethi" typeface="Nyala"/>
+        <a:font script="Beng" typeface="Vrinda"/>
+        <a:font script="Gujr" typeface="Shruti"/>
+        <a:font script="Khmr" typeface="MoolBoran"/>
+        <a:font script="Knda" typeface="Tunga"/>
+        <a:font script="Guru" typeface="Raavi"/>
+        <a:font script="Cans" typeface="Euphemia"/>
+        <a:font script="Cher" typeface="Plantagenet Cherokee"/>
+        <a:font script="Yiii" typeface="Microsoft Yi Baiti"/>
+        <a:font script="Tibt" typeface="Microsoft Himalaya"/>
+        <a:font script="Thaa" typeface="MV Boli"/>
+        <a:font script="Deva" typeface="Mangal"/>
+        <a:font script="Telu" typeface="Gautami"/>
+        <a:font script="Taml" typeface="Latha"/>
+        <a:font script="Syrc" typeface="Estrangelo Edessa"/>
+        <a:font script="Orya" typeface="Kalinga"/>
+        <a:font script="Mlym" typeface="Kartika"/>
+        <a:font script="Laoo" typeface="DokChampa"/>
+        <a:font script="Sinh" typeface="Iskoola Pota"/>
+        <a:font script="Mong" typeface="Mongolian Baiti"/>
+        <a:font script="Viet" typeface="Times New Roman"/>
+        <a:font script="Uigh" typeface="Microsoft Uighur"/>
+        <a:font script="Geor" typeface="Sylfaen"/>
+      </a:majorFont>
+      <a:minorFont>
+        <a:latin typeface="Arial"/>
+        <a:ea typeface=""/>
+        <a:cs typeface=""/>
+        <a:font script="Jpan" typeface="ＭＳ Ｐゴシック"/>
+        <a:font script="Hang" typeface="맑은 고딕"/>
+        <a:font script="Hans" typeface="宋体"/>
+        <a:font script="Hant" typeface="新細明體"/>
+        <a:font script="Arab" typeface="Arial"/>
+        <a:font script="Hebr" typeface="Arial"/>
+        <a:font script="Thai" typeface="Cordia New"/>
+        <a:font script="Ethi" typeface="Nyala"/>
+        <a:font script="Beng" typeface="Vrinda"/>
+        <a:font script="Gujr" typeface="Shruti"/>
+        <a:font script="Khmr" typeface="DaunPenh"/>
+        <a:font script="Knda" typeface="Tunga"/>
+        <a:font script="Guru" typeface="Raavi"/>
+        <a:font script="Cans" typeface="Euphemia"/>
+        <a:font script="Cher" typeface="Plantagenet Cherokee"/>
+        <a:font script="Yiii" typeface="Microsoft Yi Baiti"/>
+        <a:font script="Tibt" typeface="Microsoft Himalaya"/>
+        <a:font script="Thaa" typeface="MV Boli"/>
+        <a:font script="Deva" typeface="Mangal"/>
+        <a:font script="Telu" typeface="Gautami"/>
+        <a:font script="Taml" typeface="Latha"/>
+        <a:font script="Syrc" typeface="Estrangelo Edessa"/>
+        <a:font script="Orya" typeface="Kalinga"/>
+        <a:font script="Mlym" typeface="Kartika"/>
+        <a:font script="Laoo" typeface="DokChampa"/>
+        <a:font script="Sinh" typeface="Iskoola Pota"/>
+        <a:font script="Mong" typeface="Mongolian Baiti"/>
+        <a:font script="Viet" typeface="Arial"/>
+        <a:font script="Uigh" typeface="Microsoft Uighur"/>
+        <a:font script="Geor" typeface="Sylfaen"/>
+      </a:minorFont>
+    </a:fontScheme>
+    <a:fmtScheme name="Office">
+      <a:fillStyleLst>
+        <a:solidFill>
+          <a:schemeClr val="phClr"/>
+        </a:solidFill>
+        <a:gradFill rotWithShape="1">
+          <a:gsLst>
+            <a:gs pos="0">
+              <a:schemeClr val="phClr">
+                <a:tint val="50000"/>
+                <a:satMod val="300000"/>
+              </a:schemeClr>
+            </a:gs>
+            <a:gs pos="35000">
+              <a:schemeClr val="phClr">
+                <a:tint val="37000"/>
+                <a:satMod val="300000"/>
+              </a:schemeClr>
+            </a:gs>
+            <a:gs pos="100000">
+              <a:schemeClr val="phClr">
+                <a:tint val="15000"/>
+                <a:satMod val="350000"/>
+              </a:schemeClr>
+            </a:gs>
+          </a:gsLst>
+          <a:lin ang="16200000" scaled="1"/>
+        </a:gradFill>
+        <a:gradFill rotWithShape="1">
+          <a:gsLst>
+            <a:gs pos="0">
+              <a:schemeClr val="phClr">
+                <a:tint val="100000"/>
+                <a:shade val="100000"/>
+                <a:satMod val="130000"/>
+              </a:schemeClr>
+            </a:gs>
+            <a:gs pos="100000">
+              <a:schemeClr val="phClr">
+                <a:tint val="50000"/>
+                <a:shade val="100000"/>
+                <a:satMod val="350000"/>
+              </a:schemeClr>
+            </a:gs>
+          </a:gsLst>
+          <a:lin ang="16200000" scaled="0"/>
+        </a:gradFill>
+      </a:fillStyleLst>
+      <a:lnStyleLst>
+        <a:ln w="9525" cap="flat" cmpd="sng" algn="ctr">
+          <a:solidFill>
+            <a:schemeClr val="phClr">
+              <a:shade val="95000"/>
+              <a:satMod val="105000"/>
+            </a:schemeClr>
+          </a:solidFill>
+          <a:prstDash val="solid"/>
+        </a:ln>
+        <a:ln w="25400" cap="flat" cmpd="sng" algn="ctr">
+          <a:solidFill>
+            <a:schemeClr val="phClr"/>
+          </a:solidFill>
+          <a:prstDash val="solid"/>
+        </a:ln>
+        <a:ln w="38100" cap="flat" cmpd="sng" algn="ctr">
+          <a:solidFill>
+            <a:schemeClr val="phClr"/>
+          </a:solidFill>
+          <a:prstDash val="solid"/>
+        </a:ln>
+      </a:lnStyleLst>
+      <a:effectStyleLst>
+        <a:effectStyle>
+          <a:effectLst>
+            <a:outerShdw blurRad="40000" dist="20000" dir="5400000" rotWithShape="0">
+              <a:srgbClr val="000000">
+                <a:alpha val="38000"/>
+              </a:srgbClr>
+            </a:outerShdw>
+          </a:effectLst>
+        </a:effectStyle>
+        <a:effectStyle>
+          <a:effectLst>
+            <a:outerShdw blurRad="40000" dist="23000" dir="5400000" rotWithShape="0">
+              <a:srgbClr val="000000">
+                <a:alpha val="35000"/>
+              </a:srgbClr>
+            </a:outerShdw>
+          </a:effectLst>
+        </a:effectStyle>
+        <a:effectStyle>
+          <a:effectLst>
+            <a:outerShdw blurRad="40000" dist="23000" dir="5400000" rotWithShape="0">
+              <a:srgbClr val="000000">
+                <a:alpha val="35000"/>
+              </a:srgbClr>
+            </a:outerShdw>
+          </a:effectLst>
+          <a:scene3d>
+            <a:camera prst="orthographicFront">
+              <a:rot lat="0" lon="0" rev="0"/>
+            </a:camera>
+            <a:lightRig rig="threePt" dir="t">
+              <a:rot lat="0" lon="0" rev="1200000"/>
+            </a:lightRig>
+          </a:scene3d>
+          <a:sp3d>
+            <a:bevelT w="63500" h="25400"/>
+          </a:sp3d>
+        </a:effectStyle>
+      </a:effectStyleLst>
+      <a:bgFillStyleLst>
+        <a:solidFill>
+          <a:schemeClr val="phClr"/>
+        </a:solidFill>
+        <a:gradFill rotWithShape="1">
+          <a:gsLst>
+            <a:gs pos="0">
+              <a:schemeClr val="phClr">
+                <a:tint val="40000"/>
+                <a:satMod val="350000"/>
+              </a:schemeClr>
+            </a:gs>
+            <a:gs pos="40000">
+              <a:schemeClr val="phClr">
+                <a:tint val="45000"/>
+                <a:shade val="99000"/>
+                <a:satMod val="350000"/>
+              </a:schemeClr>
+            </a:gs>
+            <a:gs pos="100000">
+              <a:schemeClr val="phClr">
+                <a:shade val="20000"/>
+                <a:satMod val="255000"/>
+              </a:schemeClr>
+            </a:gs>
+          </a:gsLst>
+          <a:path path="circle">
+            <a:fillToRect l="50000" t="-80000" r="50000" b="180000"/>
+          </a:path>
+        </a:gradFill>
+        <a:gradFill rotWithShape="1">
+          <a:gsLst>
+            <a:gs pos="0">
+              <a:schemeClr val="phClr">
+                <a:tint val="80000"/>
+                <a:satMod val="300000"/>
+              </a:schemeClr>
+            </a:gs>
+            <a:gs pos="100000">
+              <a:schemeClr val="phClr">
+                <a:shade val="30000"/>
+                <a:satMod val="200000"/>
+              </a:schemeClr>
+            </a:gs>
+          </a:gsLst>
+          <a:path path="circle">
+            <a:fillToRect l="50000" t="50000" r="50000" b="50000"/>
+          </a:path>
+        </a:gradFill>
+      </a:bgFillStyleLst>
+    </a:fmtScheme>
+  </a:themeElements>
+</a:theme>
+</file>
+
+<file path=ppt/theme/theme2.xml><?xml version="1.0" encoding="utf-8"?>
 <a:theme xmlns:a="http://schemas.openxmlformats.org/drawingml/2006/main" xmlns:r="http://schemas.openxmlformats.org/officeDocument/2006/relationships" name="Focus">
   <a:themeElements>
     <a:clrScheme name="Focus">
@@ -15047,283 +15375,4 @@
     </a:fmtScheme>
   </a:themeElements>
 </a:theme>
-</file>
-
-<file path=ppt/theme/theme2.xml><?xml version="1.0" encoding="utf-8"?>
-<a:theme xmlns:a="http://schemas.openxmlformats.org/drawingml/2006/main" xmlns:r="http://schemas.openxmlformats.org/officeDocument/2006/relationships">
-  <a:themeElements>
-    <a:clrScheme name="Default">
-      <a:dk1>
-        <a:srgbClr val="000000"/>
-      </a:dk1>
-      <a:lt1>
-        <a:srgbClr val="FFFFFF"/>
-      </a:lt1>
-      <a:dk2>
-        <a:srgbClr val="158158"/>
-      </a:dk2>
-      <a:lt2>
-        <a:srgbClr val="F3F3F3"/>
-      </a:lt2>
-      <a:accent1>
-        <a:srgbClr val="058DC7"/>
-      </a:accent1>
-      <a:accent2>
-        <a:srgbClr val="50B432"/>
-      </a:accent2>
-      <a:accent3>
-        <a:srgbClr val="ED561B"/>
-      </a:accent3>
-      <a:accent4>
-        <a:srgbClr val="EDEF00"/>
-      </a:accent4>
-      <a:accent5>
-        <a:srgbClr val="24CBE5"/>
-      </a:accent5>
-      <a:accent6>
-        <a:srgbClr val="64E572"/>
-      </a:accent6>
-      <a:hlink>
-        <a:srgbClr val="2200CC"/>
-      </a:hlink>
-      <a:folHlink>
-        <a:srgbClr val="551A8B"/>
-      </a:folHlink>
-    </a:clrScheme>
-    <a:fontScheme name="Office">
-      <a:majorFont>
-        <a:latin typeface="Arial"/>
-        <a:ea typeface=""/>
-        <a:cs typeface=""/>
-        <a:font script="Jpan" typeface="ＭＳ Ｐゴシック"/>
-        <a:font script="Hang" typeface="맑은 고딕"/>
-        <a:font script="Hans" typeface="宋体"/>
-        <a:font script="Hant" typeface="新細明體"/>
-        <a:font script="Arab" typeface="Times New Roman"/>
-        <a:font script="Hebr" typeface="Times New Roman"/>
-        <a:font script="Thai" typeface="Angsana New"/>
-        <a:font script="Ethi" typeface="Nyala"/>
-        <a:font script="Beng" typeface="Vrinda"/>
-        <a:font script="Gujr" typeface="Shruti"/>
-        <a:font script="Khmr" typeface="MoolBoran"/>
-        <a:font script="Knda" typeface="Tunga"/>
-        <a:font script="Guru" typeface="Raavi"/>
-        <a:font script="Cans" typeface="Euphemia"/>
-        <a:font script="Cher" typeface="Plantagenet Cherokee"/>
-        <a:font script="Yiii" typeface="Microsoft Yi Baiti"/>
-        <a:font script="Tibt" typeface="Microsoft Himalaya"/>
-        <a:font script="Thaa" typeface="MV Boli"/>
-        <a:font script="Deva" typeface="Mangal"/>
-        <a:font script="Telu" typeface="Gautami"/>
-        <a:font script="Taml" typeface="Latha"/>
-        <a:font script="Syrc" typeface="Estrangelo Edessa"/>
-        <a:font script="Orya" typeface="Kalinga"/>
-        <a:font script="Mlym" typeface="Kartika"/>
-        <a:font script="Laoo" typeface="DokChampa"/>
-        <a:font script="Sinh" typeface="Iskoola Pota"/>
-        <a:font script="Mong" typeface="Mongolian Baiti"/>
-        <a:font script="Viet" typeface="Times New Roman"/>
-        <a:font script="Uigh" typeface="Microsoft Uighur"/>
-        <a:font script="Geor" typeface="Sylfaen"/>
-      </a:majorFont>
-      <a:minorFont>
-        <a:latin typeface="Arial"/>
-        <a:ea typeface=""/>
-        <a:cs typeface=""/>
-        <a:font script="Jpan" typeface="ＭＳ Ｐゴシック"/>
-        <a:font script="Hang" typeface="맑은 고딕"/>
-        <a:font script="Hans" typeface="宋体"/>
-        <a:font script="Hant" typeface="新細明體"/>
-        <a:font script="Arab" typeface="Arial"/>
-        <a:font script="Hebr" typeface="Arial"/>
-        <a:font script="Thai" typeface="Cordia New"/>
-        <a:font script="Ethi" typeface="Nyala"/>
-        <a:font script="Beng" typeface="Vrinda"/>
-        <a:font script="Gujr" typeface="Shruti"/>
-        <a:font script="Khmr" typeface="DaunPenh"/>
-        <a:font script="Knda" typeface="Tunga"/>
-        <a:font script="Guru" typeface="Raavi"/>
-        <a:font script="Cans" typeface="Euphemia"/>
-        <a:font script="Cher" typeface="Plantagenet Cherokee"/>
-        <a:font script="Yiii" typeface="Microsoft Yi Baiti"/>
-        <a:font script="Tibt" typeface="Microsoft Himalaya"/>
-        <a:font script="Thaa" typeface="MV Boli"/>
-        <a:font script="Deva" typeface="Mangal"/>
-        <a:font script="Telu" typeface="Gautami"/>
-        <a:font script="Taml" typeface="Latha"/>
-        <a:font script="Syrc" typeface="Estrangelo Edessa"/>
-        <a:font script="Orya" typeface="Kalinga"/>
-        <a:font script="Mlym" typeface="Kartika"/>
-        <a:font script="Laoo" typeface="DokChampa"/>
-        <a:font script="Sinh" typeface="Iskoola Pota"/>
-        <a:font script="Mong" typeface="Mongolian Baiti"/>
-        <a:font script="Viet" typeface="Arial"/>
-        <a:font script="Uigh" typeface="Microsoft Uighur"/>
-        <a:font script="Geor" typeface="Sylfaen"/>
-      </a:minorFont>
-    </a:fontScheme>
-    <a:fmtScheme name="Office">
-      <a:fillStyleLst>
-        <a:solidFill>
-          <a:schemeClr val="phClr"/>
-        </a:solidFill>
-        <a:gradFill rotWithShape="1">
-          <a:gsLst>
-            <a:gs pos="0">
-              <a:schemeClr val="phClr">
-                <a:tint val="50000"/>
-                <a:satMod val="300000"/>
-              </a:schemeClr>
-            </a:gs>
-            <a:gs pos="35000">
-              <a:schemeClr val="phClr">
-                <a:tint val="37000"/>
-                <a:satMod val="300000"/>
-              </a:schemeClr>
-            </a:gs>
-            <a:gs pos="100000">
-              <a:schemeClr val="phClr">
-                <a:tint val="15000"/>
-                <a:satMod val="350000"/>
-              </a:schemeClr>
-            </a:gs>
-          </a:gsLst>
-          <a:lin ang="16200000" scaled="1"/>
-        </a:gradFill>
-        <a:gradFill rotWithShape="1">
-          <a:gsLst>
-            <a:gs pos="0">
-              <a:schemeClr val="phClr">
-                <a:tint val="100000"/>
-                <a:shade val="100000"/>
-                <a:satMod val="130000"/>
-              </a:schemeClr>
-            </a:gs>
-            <a:gs pos="100000">
-              <a:schemeClr val="phClr">
-                <a:tint val="50000"/>
-                <a:shade val="100000"/>
-                <a:satMod val="350000"/>
-              </a:schemeClr>
-            </a:gs>
-          </a:gsLst>
-          <a:lin ang="16200000" scaled="0"/>
-        </a:gradFill>
-      </a:fillStyleLst>
-      <a:lnStyleLst>
-        <a:ln w="9525" cap="flat" cmpd="sng" algn="ctr">
-          <a:solidFill>
-            <a:schemeClr val="phClr">
-              <a:shade val="95000"/>
-              <a:satMod val="105000"/>
-            </a:schemeClr>
-          </a:solidFill>
-          <a:prstDash val="solid"/>
-        </a:ln>
-        <a:ln w="25400" cap="flat" cmpd="sng" algn="ctr">
-          <a:solidFill>
-            <a:schemeClr val="phClr"/>
-          </a:solidFill>
-          <a:prstDash val="solid"/>
-        </a:ln>
-        <a:ln w="38100" cap="flat" cmpd="sng" algn="ctr">
-          <a:solidFill>
-            <a:schemeClr val="phClr"/>
-          </a:solidFill>
-          <a:prstDash val="solid"/>
-        </a:ln>
-      </a:lnStyleLst>
-      <a:effectStyleLst>
-        <a:effectStyle>
-          <a:effectLst>
-            <a:outerShdw blurRad="40000" dist="20000" dir="5400000" rotWithShape="0">
-              <a:srgbClr val="000000">
-                <a:alpha val="38000"/>
-              </a:srgbClr>
-            </a:outerShdw>
-          </a:effectLst>
-        </a:effectStyle>
-        <a:effectStyle>
-          <a:effectLst>
-            <a:outerShdw blurRad="40000" dist="23000" dir="5400000" rotWithShape="0">
-              <a:srgbClr val="000000">
-                <a:alpha val="35000"/>
-              </a:srgbClr>
-            </a:outerShdw>
-          </a:effectLst>
-        </a:effectStyle>
-        <a:effectStyle>
-          <a:effectLst>
-            <a:outerShdw blurRad="40000" dist="23000" dir="5400000" rotWithShape="0">
-              <a:srgbClr val="000000">
-                <a:alpha val="35000"/>
-              </a:srgbClr>
-            </a:outerShdw>
-          </a:effectLst>
-          <a:scene3d>
-            <a:camera prst="orthographicFront">
-              <a:rot lat="0" lon="0" rev="0"/>
-            </a:camera>
-            <a:lightRig rig="threePt" dir="t">
-              <a:rot lat="0" lon="0" rev="1200000"/>
-            </a:lightRig>
-          </a:scene3d>
-          <a:sp3d>
-            <a:bevelT w="63500" h="25400"/>
-          </a:sp3d>
-        </a:effectStyle>
-      </a:effectStyleLst>
-      <a:bgFillStyleLst>
-        <a:solidFill>
-          <a:schemeClr val="phClr"/>
-        </a:solidFill>
-        <a:gradFill rotWithShape="1">
-          <a:gsLst>
-            <a:gs pos="0">
-              <a:schemeClr val="phClr">
-                <a:tint val="40000"/>
-                <a:satMod val="350000"/>
-              </a:schemeClr>
-            </a:gs>
-            <a:gs pos="40000">
-              <a:schemeClr val="phClr">
-                <a:tint val="45000"/>
-                <a:shade val="99000"/>
-                <a:satMod val="350000"/>
-              </a:schemeClr>
-            </a:gs>
-            <a:gs pos="100000">
-              <a:schemeClr val="phClr">
-                <a:shade val="20000"/>
-                <a:satMod val="255000"/>
-              </a:schemeClr>
-            </a:gs>
-          </a:gsLst>
-          <a:path path="circle">
-            <a:fillToRect l="50000" t="-80000" r="50000" b="180000"/>
-          </a:path>
-        </a:gradFill>
-        <a:gradFill rotWithShape="1">
-          <a:gsLst>
-            <a:gs pos="0">
-              <a:schemeClr val="phClr">
-                <a:tint val="80000"/>
-                <a:satMod val="300000"/>
-              </a:schemeClr>
-            </a:gs>
-            <a:gs pos="100000">
-              <a:schemeClr val="phClr">
-                <a:shade val="30000"/>
-                <a:satMod val="200000"/>
-              </a:schemeClr>
-            </a:gs>
-          </a:gsLst>
-          <a:path path="circle">
-            <a:fillToRect l="50000" t="50000" r="50000" b="50000"/>
-          </a:path>
-        </a:gradFill>
-      </a:bgFillStyleLst>
-    </a:fmtScheme>
-  </a:themeElements>
-</a:theme>
 </file>
</xml_diff>